<commit_message>
initial gradle implementation of the ami script formatting changes to view better on projector screens
</commit_message>
<xml_diff>
--- a/MongoDB-Hadoop Workshop 2014-10-01.pptx
+++ b/MongoDB-Hadoop Workshop 2014-10-01.pptx
@@ -36750,15 +36750,39 @@
               </a:lnSpc>
             </a:pPr>
             <a:r>
-              <a:rPr lang="en-US" sz="1600"/>
+              <a:rPr lang="en-US" sz="1600" dirty="0"/>
               <a:t>public static class Map extends </a:t>
             </a:r>
             <a:br>
-              <a:rPr lang="en-US" sz="1600"/>
+              <a:rPr lang="en-US" sz="1600" dirty="0"/>
             </a:br>
             <a:r>
-              <a:rPr lang="en-US" sz="1600"/>
-              <a:t>  Mapper&lt;Object, BSONObject, IntWritable, DoubleWritable&gt; {</a:t>
+              <a:rPr lang="en-US" sz="1600" dirty="0"/>
+              <a:t>  Mapper&lt;Object, </a:t>
+            </a:r>
+            <a:r>
+              <a:rPr lang="en-US" sz="1600" dirty="0" err="1"/>
+              <a:t>BSONObject</a:t>
+            </a:r>
+            <a:r>
+              <a:rPr lang="en-US" sz="1600" dirty="0"/>
+              <a:t>, </a:t>
+            </a:r>
+            <a:r>
+              <a:rPr lang="en-US" sz="1600" dirty="0" err="1"/>
+              <a:t>IntWritable</a:t>
+            </a:r>
+            <a:r>
+              <a:rPr lang="en-US" sz="1600" dirty="0"/>
+              <a:t>, </a:t>
+            </a:r>
+            <a:r>
+              <a:rPr lang="en-US" sz="1600" dirty="0" err="1"/>
+              <a:t>DoubleWritable</a:t>
+            </a:r>
+            <a:r>
+              <a:rPr lang="en-US" sz="1600" dirty="0"/>
+              <a:t>&gt; {</a:t>
             </a:r>
           </a:p>
           <a:p>
@@ -36768,7 +36792,7 @@
               </a:lnSpc>
             </a:pPr>
             <a:r>
-              <a:rPr lang="en-US" sz="1600"/>
+              <a:rPr lang="en-US" sz="1600" dirty="0"/>
               <a:t>    @Override</a:t>
             </a:r>
           </a:p>
@@ -36779,22 +36803,38 @@
               </a:lnSpc>
             </a:pPr>
             <a:r>
-              <a:rPr lang="en-US" sz="1600"/>
-              <a:t>    public void map(final Object key, final BSONObject doc, </a:t>
+              <a:rPr lang="en-US" sz="1600" dirty="0"/>
+              <a:t>    public void map(final Object key, final </a:t>
+            </a:r>
+            <a:r>
+              <a:rPr lang="en-US" sz="1600" dirty="0" err="1"/>
+              <a:t>BSONObject</a:t>
+            </a:r>
+            <a:r>
+              <a:rPr lang="en-US" sz="1600" dirty="0"/>
+              <a:t> doc, </a:t>
             </a:r>
             <a:br>
-              <a:rPr lang="en-US" sz="1600"/>
+              <a:rPr lang="en-US" sz="1600" dirty="0"/>
             </a:br>
             <a:r>
-              <a:rPr lang="en-US" sz="1600"/>
+              <a:rPr lang="en-US" sz="1600" dirty="0"/>
               <a:t>      final Context context) throws </a:t>
             </a:r>
             <a:br>
-              <a:rPr lang="en-US" sz="1600"/>
+              <a:rPr lang="en-US" sz="1600" dirty="0"/>
             </a:br>
             <a:r>
-              <a:rPr lang="en-US" sz="1600"/>
-              <a:t>      IOException,InterruptedException {</a:t>
+              <a:rPr lang="en-US" sz="1600" dirty="0"/>
+              <a:t>      </a:t>
+            </a:r>
+            <a:r>
+              <a:rPr lang="en-US" sz="1600" dirty="0" err="1"/>
+              <a:t>IOException,InterruptedException</a:t>
+            </a:r>
+            <a:r>
+              <a:rPr lang="en-US" sz="1600" dirty="0"/>
+              <a:t> {</a:t>
             </a:r>
           </a:p>
           <a:p>
@@ -36804,8 +36844,40 @@
               </a:lnSpc>
             </a:pPr>
             <a:r>
-              <a:rPr lang="en-US" sz="1600"/>
-              <a:t>        final int movieId = (Integer)doc.get("movieid");</a:t>
+              <a:rPr lang="en-US" sz="1600" dirty="0"/>
+              <a:t>        final </a:t>
+            </a:r>
+            <a:r>
+              <a:rPr lang="en-US" sz="1600" dirty="0" err="1"/>
+              <a:t>int</a:t>
+            </a:r>
+            <a:r>
+              <a:rPr lang="en-US" sz="1600" dirty="0"/>
+              <a:t> </a:t>
+            </a:r>
+            <a:r>
+              <a:rPr lang="en-US" sz="1600" dirty="0" err="1"/>
+              <a:t>movieId</a:t>
+            </a:r>
+            <a:r>
+              <a:rPr lang="en-US" sz="1600" dirty="0"/>
+              <a:t> = (Integer)</a:t>
+            </a:r>
+            <a:r>
+              <a:rPr lang="en-US" sz="1600" dirty="0" err="1"/>
+              <a:t>doc.get</a:t>
+            </a:r>
+            <a:r>
+              <a:rPr lang="en-US" sz="1600" dirty="0"/>
+              <a:t>("</a:t>
+            </a:r>
+            <a:r>
+              <a:rPr lang="en-US" sz="1600" dirty="0" err="1"/>
+              <a:t>movieid</a:t>
+            </a:r>
+            <a:r>
+              <a:rPr lang="en-US" sz="1600" dirty="0"/>
+              <a:t>");</a:t>
             </a:r>
           </a:p>
           <a:p>
@@ -36815,8 +36887,24 @@
               </a:lnSpc>
             </a:pPr>
             <a:r>
-              <a:rPr lang="en-US" sz="1600"/>
-              <a:t>        final double movieRating = (Double)doc.get("rating");</a:t>
+              <a:rPr lang="en-US" sz="1600" dirty="0"/>
+              <a:t>        final double </a:t>
+            </a:r>
+            <a:r>
+              <a:rPr lang="en-US" sz="1600" dirty="0" err="1"/>
+              <a:t>movieRating</a:t>
+            </a:r>
+            <a:r>
+              <a:rPr lang="en-US" sz="1600" dirty="0"/>
+              <a:t> = (Double)</a:t>
+            </a:r>
+            <a:r>
+              <a:rPr lang="en-US" sz="1600" dirty="0" err="1"/>
+              <a:t>doc.get</a:t>
+            </a:r>
+            <a:r>
+              <a:rPr lang="en-US" sz="1600" dirty="0"/>
+              <a:t>("rating");</a:t>
             </a:r>
           </a:p>
           <a:p>
@@ -36826,15 +36914,55 @@
               </a:lnSpc>
             </a:pPr>
             <a:r>
-              <a:rPr lang="en-US" sz="1600"/>
-              <a:t>        context.write(new IntWritable(movieId), </a:t>
+              <a:rPr lang="en-US" sz="1600" dirty="0"/>
+              <a:t>        </a:t>
+            </a:r>
+            <a:r>
+              <a:rPr lang="en-US" sz="1600" dirty="0" err="1"/>
+              <a:t>context.write</a:t>
+            </a:r>
+            <a:r>
+              <a:rPr lang="en-US" sz="1600" dirty="0"/>
+              <a:t>(new </a:t>
+            </a:r>
+            <a:r>
+              <a:rPr lang="en-US" sz="1600" dirty="0" err="1"/>
+              <a:t>IntWritable</a:t>
+            </a:r>
+            <a:r>
+              <a:rPr lang="en-US" sz="1600" dirty="0"/>
+              <a:t>(</a:t>
+            </a:r>
+            <a:r>
+              <a:rPr lang="en-US" sz="1600" dirty="0" err="1"/>
+              <a:t>movieId</a:t>
+            </a:r>
+            <a:r>
+              <a:rPr lang="en-US" sz="1600" dirty="0"/>
+              <a:t>), </a:t>
             </a:r>
             <a:br>
-              <a:rPr lang="en-US" sz="1600"/>
+              <a:rPr lang="en-US" sz="1600" dirty="0"/>
             </a:br>
             <a:r>
-              <a:rPr lang="en-US" sz="1600"/>
-              <a:t>          new DoubleWritable(movieRating));</a:t>
+              <a:rPr lang="en-US" sz="1600" dirty="0"/>
+              <a:t>          new </a:t>
+            </a:r>
+            <a:r>
+              <a:rPr lang="en-US" sz="1600" dirty="0" err="1"/>
+              <a:t>DoubleWritable</a:t>
+            </a:r>
+            <a:r>
+              <a:rPr lang="en-US" sz="1600" dirty="0"/>
+              <a:t>(</a:t>
+            </a:r>
+            <a:r>
+              <a:rPr lang="en-US" sz="1600" dirty="0" err="1"/>
+              <a:t>movieRating</a:t>
+            </a:r>
+            <a:r>
+              <a:rPr lang="en-US" sz="1600" dirty="0"/>
+              <a:t>));</a:t>
             </a:r>
           </a:p>
           <a:p>
@@ -36844,7 +36972,7 @@
               </a:lnSpc>
             </a:pPr>
             <a:r>
-              <a:rPr lang="en-US" sz="1600"/>
+              <a:rPr lang="en-US" sz="1600" dirty="0"/>
               <a:t>    }</a:t>
             </a:r>
           </a:p>
@@ -36855,7 +36983,7 @@
               </a:lnSpc>
             </a:pPr>
             <a:r>
-              <a:rPr lang="en-US" sz="1600"/>
+              <a:rPr lang="en-US" sz="1600" dirty="0"/>
               <a:t>}</a:t>
             </a:r>
           </a:p>
@@ -36877,8 +37005,12 @@
           <a:lstStyle/>
           <a:p>
             <a:r>
-              <a:rPr lang="en-US"/>
-              <a:t>MapReduce: Map Phase</a:t>
+              <a:rPr lang="en-US" dirty="0" err="1"/>
+              <a:t>MapReduce</a:t>
+            </a:r>
+            <a:r>
+              <a:rPr lang="en-US" dirty="0"/>
+              <a:t>: Map Phase</a:t>
             </a:r>
           </a:p>
         </p:txBody>
@@ -37033,7 +37165,7 @@
               </a:lnSpc>
             </a:pPr>
             <a:r>
-              <a:rPr lang="en-US" sz="1600"/>
+              <a:rPr lang="en-US" sz="1600" dirty="0"/>
               <a:t>public static class Reduce extends </a:t>
             </a:r>
           </a:p>
@@ -37044,8 +37176,40 @@
               </a:lnSpc>
             </a:pPr>
             <a:r>
-              <a:rPr lang="en-US" sz="1600"/>
-              <a:t>	Reducer&lt;IntWritable, DoubleWritable, NullWritable, BSONWritable&gt; {</a:t>
+              <a:rPr lang="en-US" sz="1600" dirty="0"/>
+              <a:t>	Reducer&lt;</a:t>
+            </a:r>
+            <a:r>
+              <a:rPr lang="en-US" sz="1600" dirty="0" err="1"/>
+              <a:t>IntWritable</a:t>
+            </a:r>
+            <a:r>
+              <a:rPr lang="en-US" sz="1600" dirty="0"/>
+              <a:t>, </a:t>
+            </a:r>
+            <a:r>
+              <a:rPr lang="en-US" sz="1600" dirty="0" err="1"/>
+              <a:t>DoubleWritable</a:t>
+            </a:r>
+            <a:r>
+              <a:rPr lang="en-US" sz="1600" dirty="0"/>
+              <a:t>, </a:t>
+            </a:r>
+            <a:r>
+              <a:rPr lang="en-US" sz="1600" dirty="0" err="1"/>
+              <a:t>NullWritable</a:t>
+            </a:r>
+            <a:r>
+              <a:rPr lang="en-US" sz="1600" dirty="0"/>
+              <a:t>, </a:t>
+            </a:r>
+            <a:r>
+              <a:rPr lang="en-US" sz="1600" dirty="0" err="1"/>
+              <a:t>BSONWritable</a:t>
+            </a:r>
+            <a:r>
+              <a:rPr lang="en-US" sz="1600" dirty="0"/>
+              <a:t>&gt; {</a:t>
             </a:r>
           </a:p>
           <a:p>
@@ -37055,7 +37219,7 @@
               </a:lnSpc>
             </a:pPr>
             <a:r>
-              <a:rPr lang="en-US" sz="1600"/>
+              <a:rPr lang="en-US" sz="1600" dirty="0"/>
               <a:t>    @Override</a:t>
             </a:r>
           </a:p>
@@ -37066,22 +37230,62 @@
               </a:lnSpc>
             </a:pPr>
             <a:r>
-              <a:rPr lang="en-US" sz="1600"/>
-              <a:t>    public void reduce(final IntWritable key, </a:t>
+              <a:rPr lang="en-US" sz="1600" dirty="0"/>
+              <a:t>    public void reduce(final </a:t>
+            </a:r>
+            <a:r>
+              <a:rPr lang="en-US" sz="1600" dirty="0" err="1"/>
+              <a:t>IntWritable</a:t>
+            </a:r>
+            <a:r>
+              <a:rPr lang="en-US" sz="1600" dirty="0"/>
+              <a:t> key, </a:t>
             </a:r>
             <a:br>
-              <a:rPr lang="en-US" sz="1600"/>
+              <a:rPr lang="en-US" sz="1600" dirty="0"/>
             </a:br>
             <a:r>
-              <a:rPr lang="en-US" sz="1600"/>
-              <a:t>      final Iterable&lt;DoubleWritable&gt; values, final Context context)</a:t>
+              <a:rPr lang="en-US" sz="1600" dirty="0"/>
+              <a:t>      final </a:t>
+            </a:r>
+            <a:r>
+              <a:rPr lang="en-US" sz="1600" dirty="0" err="1"/>
+              <a:t>Iterable</a:t>
+            </a:r>
+            <a:r>
+              <a:rPr lang="en-US" sz="1600" dirty="0"/>
+              <a:t>&lt;</a:t>
+            </a:r>
+            <a:r>
+              <a:rPr lang="en-US" sz="1600" dirty="0" err="1"/>
+              <a:t>DoubleWritable</a:t>
+            </a:r>
+            <a:r>
+              <a:rPr lang="en-US" sz="1600" dirty="0"/>
+              <a:t>&gt; values, final Context context)</a:t>
             </a:r>
             <a:br>
-              <a:rPr lang="en-US" sz="1600"/>
+              <a:rPr lang="en-US" sz="1600" dirty="0"/>
             </a:br>
             <a:r>
-              <a:rPr lang="en-US" sz="1600"/>
-              <a:t>      throws IOException, InterruptedException {</a:t>
+              <a:rPr lang="en-US" sz="1600" dirty="0"/>
+              <a:t>      throws </a:t>
+            </a:r>
+            <a:r>
+              <a:rPr lang="en-US" sz="1600" dirty="0" err="1"/>
+              <a:t>IOException</a:t>
+            </a:r>
+            <a:r>
+              <a:rPr lang="en-US" sz="1600" dirty="0"/>
+              <a:t>, </a:t>
+            </a:r>
+            <a:r>
+              <a:rPr lang="en-US" sz="1600" dirty="0" err="1"/>
+              <a:t>InterruptedException</a:t>
+            </a:r>
+            <a:r>
+              <a:rPr lang="en-US" sz="1600" dirty="0"/>
+              <a:t> {</a:t>
             </a:r>
           </a:p>
           <a:p>
@@ -37091,8 +37295,24 @@
               </a:lnSpc>
             </a:pPr>
             <a:r>
-              <a:rPr lang="en-US" sz="1600"/>
-              <a:t>        DescriptiveStatistics stats = new DescriptiveStatistics();</a:t>
+              <a:rPr lang="en-US" sz="1600" dirty="0"/>
+              <a:t>        </a:t>
+            </a:r>
+            <a:r>
+              <a:rPr lang="en-US" sz="1600" dirty="0" err="1"/>
+              <a:t>DescriptiveStatistics</a:t>
+            </a:r>
+            <a:r>
+              <a:rPr lang="en-US" sz="1600" dirty="0"/>
+              <a:t> stats = new </a:t>
+            </a:r>
+            <a:r>
+              <a:rPr lang="en-US" sz="1600" dirty="0" err="1"/>
+              <a:t>DescriptiveStatistics</a:t>
+            </a:r>
+            <a:r>
+              <a:rPr lang="en-US" sz="1600" dirty="0"/>
+              <a:t>();</a:t>
             </a:r>
           </a:p>
           <a:p>
@@ -37102,8 +37322,32 @@
               </a:lnSpc>
             </a:pPr>
             <a:r>
-              <a:rPr lang="en-US" sz="1600"/>
-              <a:t>        for(DoubleWritable r : values) { stats.addValue(r.get()); }</a:t>
+              <a:rPr lang="en-US" sz="1600" dirty="0"/>
+              <a:t>        for(</a:t>
+            </a:r>
+            <a:r>
+              <a:rPr lang="en-US" sz="1600" dirty="0" err="1"/>
+              <a:t>DoubleWritable</a:t>
+            </a:r>
+            <a:r>
+              <a:rPr lang="en-US" sz="1600" dirty="0"/>
+              <a:t> r : values) { </a:t>
+            </a:r>
+            <a:r>
+              <a:rPr lang="en-US" sz="1600" dirty="0" err="1"/>
+              <a:t>stats.addValue</a:t>
+            </a:r>
+            <a:r>
+              <a:rPr lang="en-US" sz="1600" dirty="0"/>
+              <a:t>(</a:t>
+            </a:r>
+            <a:r>
+              <a:rPr lang="en-US" sz="1600" dirty="0" err="1"/>
+              <a:t>r.get</a:t>
+            </a:r>
+            <a:r>
+              <a:rPr lang="en-US" sz="1600" dirty="0"/>
+              <a:t>()); }</a:t>
             </a:r>
           </a:p>
           <a:p>
@@ -37113,50 +37357,130 @@
               </a:lnSpc>
             </a:pPr>
             <a:r>
-              <a:rPr lang="en-US" sz="1600"/>
-              <a:t>        DBObject builder = new BasicDBObjectBuilder().start()</a:t>
+              <a:rPr lang="en-US" sz="1600" dirty="0"/>
+              <a:t>        </a:t>
+            </a:r>
+            <a:r>
+              <a:rPr lang="en-US" sz="1600" dirty="0" err="1"/>
+              <a:t>DBObject</a:t>
+            </a:r>
+            <a:r>
+              <a:rPr lang="en-US" sz="1600" dirty="0"/>
+              <a:t> builder = new </a:t>
+            </a:r>
+            <a:r>
+              <a:rPr lang="en-US" sz="1600" dirty="0" err="1"/>
+              <a:t>BasicDBObjectBuilder</a:t>
+            </a:r>
+            <a:r>
+              <a:rPr lang="en-US" sz="1600" dirty="0"/>
+              <a:t>().start()</a:t>
             </a:r>
             <a:br>
-              <a:rPr lang="en-US" sz="1600"/>
+              <a:rPr lang="en-US" sz="1600" dirty="0"/>
             </a:br>
             <a:r>
-              <a:rPr lang="en-US" sz="1600"/>
-              <a:t>          .add("movieid", key.get())</a:t>
+              <a:rPr lang="en-US" sz="1600" dirty="0"/>
+              <a:t>          .add("</a:t>
+            </a:r>
+            <a:r>
+              <a:rPr lang="en-US" sz="1600" dirty="0" err="1"/>
+              <a:t>movieid</a:t>
+            </a:r>
+            <a:r>
+              <a:rPr lang="en-US" sz="1600" dirty="0"/>
+              <a:t>", </a:t>
+            </a:r>
+            <a:r>
+              <a:rPr lang="en-US" sz="1600" dirty="0" err="1"/>
+              <a:t>key.get</a:t>
+            </a:r>
+            <a:r>
+              <a:rPr lang="en-US" sz="1600" dirty="0"/>
+              <a:t>())</a:t>
             </a:r>
             <a:br>
-              <a:rPr lang="en-US" sz="1600"/>
+              <a:rPr lang="en-US" sz="1600" dirty="0"/>
             </a:br>
             <a:r>
-              <a:rPr lang="en-US" sz="1600"/>
-              <a:t>          .add("mean", stats.getMean())</a:t>
+              <a:rPr lang="en-US" sz="1600" dirty="0"/>
+              <a:t>          .add("mean", </a:t>
+            </a:r>
+            <a:r>
+              <a:rPr lang="en-US" sz="1600" dirty="0" err="1"/>
+              <a:t>stats.getMean</a:t>
+            </a:r>
+            <a:r>
+              <a:rPr lang="en-US" sz="1600" dirty="0"/>
+              <a:t>())</a:t>
             </a:r>
             <a:br>
-              <a:rPr lang="en-US" sz="1600"/>
+              <a:rPr lang="en-US" sz="1600" dirty="0"/>
             </a:br>
             <a:r>
-              <a:rPr lang="en-US" sz="1600"/>
-              <a:t>          .add("median", stats.getPercentile(50))</a:t>
+              <a:rPr lang="en-US" sz="1600" dirty="0"/>
+              <a:t>          .add("median", </a:t>
+            </a:r>
+            <a:r>
+              <a:rPr lang="en-US" sz="1600" dirty="0" err="1"/>
+              <a:t>stats.getPercentile</a:t>
+            </a:r>
+            <a:r>
+              <a:rPr lang="en-US" sz="1600" dirty="0"/>
+              <a:t>(50))</a:t>
             </a:r>
             <a:br>
-              <a:rPr lang="en-US" sz="1600"/>
+              <a:rPr lang="en-US" sz="1600" dirty="0"/>
             </a:br>
             <a:r>
-              <a:rPr lang="en-US" sz="1600"/>
-              <a:t>          .add("std", stats.getStandardDeviation())</a:t>
+              <a:rPr lang="en-US" sz="1600" dirty="0"/>
+              <a:t>          .add("</a:t>
+            </a:r>
+            <a:r>
+              <a:rPr lang="en-US" sz="1600" dirty="0" err="1"/>
+              <a:t>std</a:t>
+            </a:r>
+            <a:r>
+              <a:rPr lang="en-US" sz="1600" dirty="0"/>
+              <a:t>", </a:t>
+            </a:r>
+            <a:r>
+              <a:rPr lang="en-US" sz="1600" dirty="0" err="1"/>
+              <a:t>stats.getStandardDeviation</a:t>
+            </a:r>
+            <a:r>
+              <a:rPr lang="en-US" sz="1600" dirty="0"/>
+              <a:t>())</a:t>
             </a:r>
             <a:br>
-              <a:rPr lang="en-US" sz="1600"/>
+              <a:rPr lang="en-US" sz="1600" dirty="0"/>
             </a:br>
             <a:r>
-              <a:rPr lang="en-US" sz="1600"/>
-              <a:t>          .add("count", stats.getN())</a:t>
+              <a:rPr lang="en-US" sz="1600" dirty="0"/>
+              <a:t>          .add("count", </a:t>
+            </a:r>
+            <a:r>
+              <a:rPr lang="en-US" sz="1600" dirty="0" err="1"/>
+              <a:t>stats.getN</a:t>
+            </a:r>
+            <a:r>
+              <a:rPr lang="en-US" sz="1600" dirty="0"/>
+              <a:t>())</a:t>
             </a:r>
             <a:br>
-              <a:rPr lang="en-US" sz="1600"/>
+              <a:rPr lang="en-US" sz="1600" dirty="0"/>
             </a:br>
             <a:r>
-              <a:rPr lang="en-US" sz="1600"/>
-              <a:t>          .add("total", stats.getSum()).get();</a:t>
+              <a:rPr lang="en-US" sz="1600" dirty="0"/>
+              <a:t>          .add("total", </a:t>
+            </a:r>
+            <a:r>
+              <a:rPr lang="en-US" sz="1600" dirty="0" err="1"/>
+              <a:t>stats.getSum</a:t>
+            </a:r>
+            <a:r>
+              <a:rPr lang="en-US" sz="1600" dirty="0"/>
+              <a:t>()).get();</a:t>
             </a:r>
           </a:p>
           <a:p>
@@ -37166,8 +37490,24 @@
               </a:lnSpc>
             </a:pPr>
             <a:r>
-              <a:rPr lang="en-US" sz="1600"/>
-              <a:t>        BSONWritable doc = new BSONWritable(builder);</a:t>
+              <a:rPr lang="en-US" sz="1600" dirty="0"/>
+              <a:t>        </a:t>
+            </a:r>
+            <a:r>
+              <a:rPr lang="en-US" sz="1600" dirty="0" err="1"/>
+              <a:t>BSONWritable</a:t>
+            </a:r>
+            <a:r>
+              <a:rPr lang="en-US" sz="1600" dirty="0"/>
+              <a:t> doc = new </a:t>
+            </a:r>
+            <a:r>
+              <a:rPr lang="en-US" sz="1600" dirty="0" err="1"/>
+              <a:t>BSONWritable</a:t>
+            </a:r>
+            <a:r>
+              <a:rPr lang="en-US" sz="1600" dirty="0"/>
+              <a:t>(builder);</a:t>
             </a:r>
           </a:p>
           <a:p>
@@ -37177,8 +37517,24 @@
               </a:lnSpc>
             </a:pPr>
             <a:r>
-              <a:rPr lang="en-US" sz="1600"/>
-              <a:t>        context.write(NullWritable.get(), doc);</a:t>
+              <a:rPr lang="en-US" sz="1600" dirty="0"/>
+              <a:t>        </a:t>
+            </a:r>
+            <a:r>
+              <a:rPr lang="en-US" sz="1600" dirty="0" err="1"/>
+              <a:t>context.write</a:t>
+            </a:r>
+            <a:r>
+              <a:rPr lang="en-US" sz="1600" dirty="0"/>
+              <a:t>(</a:t>
+            </a:r>
+            <a:r>
+              <a:rPr lang="en-US" sz="1600" dirty="0" err="1"/>
+              <a:t>NullWritable.get</a:t>
+            </a:r>
+            <a:r>
+              <a:rPr lang="en-US" sz="1600" dirty="0"/>
+              <a:t>(), doc);</a:t>
             </a:r>
           </a:p>
           <a:p>
@@ -37188,7 +37544,7 @@
               </a:lnSpc>
             </a:pPr>
             <a:r>
-              <a:rPr lang="en-US" sz="1600"/>
+              <a:rPr lang="en-US" sz="1600" dirty="0"/>
               <a:t>    }</a:t>
             </a:r>
           </a:p>
@@ -37199,7 +37555,7 @@
               </a:lnSpc>
             </a:pPr>
             <a:r>
-              <a:rPr lang="en-US" sz="1600"/>
+              <a:rPr lang="en-US" sz="1600" dirty="0"/>
               <a:t>}</a:t>
             </a:r>
           </a:p>
@@ -38105,55 +38461,143 @@
           <a:lstStyle/>
           <a:p>
             <a:r>
-              <a:rPr lang="en-US"/>
-              <a:t>$ mvn clean package</a:t>
-            </a:r>
-          </a:p>
-          <a:p>
-            <a:endParaRPr lang="en-US"/>
-          </a:p>
-          <a:p>
-            <a:r>
-              <a:rPr lang="en-US"/>
-              <a:t>$ cp target/lib/mongo-*.jar \</a:t>
-            </a:r>
-          </a:p>
-          <a:p>
-            <a:r>
-              <a:rPr lang="en-US"/>
-              <a:t>	/usr/local/hadoop/share/hadoop/common/lib</a:t>
-            </a:r>
-          </a:p>
-          <a:p>
-            <a:endParaRPr lang="en-US"/>
-          </a:p>
-          <a:p>
-            <a:r>
-              <a:rPr lang="en-US"/>
-              <a:t>$ hadoop jar target/mapreduce-1.0-SNAPSHOT.jar \</a:t>
-            </a:r>
-          </a:p>
-          <a:p>
-            <a:r>
-              <a:rPr lang="en-US"/>
-              <a:t>	com.mongodb.workshop.MapReduceExercise \</a:t>
-            </a:r>
-          </a:p>
-          <a:p>
-            <a:r>
-              <a:rPr lang="en-US"/>
-              <a:t>	mongodb://127.0.0.1:27017/movielens.ratings \</a:t>
-            </a:r>
-          </a:p>
-          <a:p>
-            <a:r>
-              <a:rPr lang="en-US"/>
-              <a:t>	mongodb://127.0.0.1:27017/movielens.mapreduce_exercise \</a:t>
-            </a:r>
-          </a:p>
-          <a:p>
-            <a:r>
-              <a:rPr lang="en-US"/>
+              <a:rPr lang="en-US" dirty="0"/>
+              <a:t>$ </a:t>
+            </a:r>
+            <a:r>
+              <a:rPr lang="en-US" dirty="0" err="1"/>
+              <a:t>mvn</a:t>
+            </a:r>
+            <a:r>
+              <a:rPr lang="en-US" dirty="0"/>
+              <a:t> clean package</a:t>
+            </a:r>
+          </a:p>
+          <a:p>
+            <a:endParaRPr lang="en-US" dirty="0"/>
+          </a:p>
+          <a:p>
+            <a:r>
+              <a:rPr lang="en-US" dirty="0"/>
+              <a:t>$ </a:t>
+            </a:r>
+            <a:r>
+              <a:rPr lang="en-US" dirty="0" err="1"/>
+              <a:t>cp</a:t>
+            </a:r>
+            <a:r>
+              <a:rPr lang="en-US" dirty="0"/>
+              <a:t> target/lib/mongo-*.jar \</a:t>
+            </a:r>
+          </a:p>
+          <a:p>
+            <a:r>
+              <a:rPr lang="en-US" dirty="0"/>
+              <a:t>	/</a:t>
+            </a:r>
+            <a:r>
+              <a:rPr lang="en-US" dirty="0" err="1"/>
+              <a:t>usr</a:t>
+            </a:r>
+            <a:r>
+              <a:rPr lang="en-US" dirty="0"/>
+              <a:t>/local/</a:t>
+            </a:r>
+            <a:r>
+              <a:rPr lang="en-US" dirty="0" err="1"/>
+              <a:t>hadoop</a:t>
+            </a:r>
+            <a:r>
+              <a:rPr lang="en-US" dirty="0"/>
+              <a:t>/share/</a:t>
+            </a:r>
+            <a:r>
+              <a:rPr lang="en-US" dirty="0" err="1"/>
+              <a:t>hadoop</a:t>
+            </a:r>
+            <a:r>
+              <a:rPr lang="en-US" dirty="0"/>
+              <a:t>/common/lib</a:t>
+            </a:r>
+          </a:p>
+          <a:p>
+            <a:endParaRPr lang="en-US" dirty="0"/>
+          </a:p>
+          <a:p>
+            <a:r>
+              <a:rPr lang="en-US" dirty="0"/>
+              <a:t>$ </a:t>
+            </a:r>
+            <a:r>
+              <a:rPr lang="en-US" dirty="0" err="1"/>
+              <a:t>hadoop</a:t>
+            </a:r>
+            <a:r>
+              <a:rPr lang="en-US" dirty="0"/>
+              <a:t> jar target/mapreduce-1.0-SNAPSHOT.jar \</a:t>
+            </a:r>
+          </a:p>
+          <a:p>
+            <a:r>
+              <a:rPr lang="en-US" dirty="0"/>
+              <a:t>	</a:t>
+            </a:r>
+            <a:r>
+              <a:rPr lang="en-US" dirty="0" err="1"/>
+              <a:t>com.mongodb.workshop.MapReduceExercise</a:t>
+            </a:r>
+            <a:r>
+              <a:rPr lang="en-US" dirty="0"/>
+              <a:t> \</a:t>
+            </a:r>
+          </a:p>
+          <a:p>
+            <a:r>
+              <a:rPr lang="en-US" dirty="0"/>
+              <a:t>	</a:t>
+            </a:r>
+            <a:r>
+              <a:rPr lang="en-US" dirty="0" err="1"/>
+              <a:t>mongodb</a:t>
+            </a:r>
+            <a:r>
+              <a:rPr lang="en-US" dirty="0"/>
+              <a:t>://127.0.0.1:27017/</a:t>
+            </a:r>
+            <a:r>
+              <a:rPr lang="en-US" dirty="0" err="1"/>
+              <a:t>movielens.ratings</a:t>
+            </a:r>
+            <a:r>
+              <a:rPr lang="en-US" dirty="0"/>
+              <a:t> \</a:t>
+            </a:r>
+          </a:p>
+          <a:p>
+            <a:r>
+              <a:rPr lang="en-US" dirty="0"/>
+              <a:t>	</a:t>
+            </a:r>
+            <a:r>
+              <a:rPr lang="en-US" dirty="0" err="1"/>
+              <a:t>mongodb</a:t>
+            </a:r>
+            <a:r>
+              <a:rPr lang="en-US" dirty="0"/>
+              <a:t>://127.0.0.1:27017/</a:t>
+            </a:r>
+            <a:r>
+              <a:rPr lang="en-US" dirty="0" err="1"/>
+              <a:t>movielens.mapreduce_exercise</a:t>
+            </a:r>
+            <a:r>
+              <a:rPr lang="en-US" dirty="0"/>
+              <a:t> \</a:t>
+            </a:r>
+          </a:p>
+          <a:p>
+            <a:r>
+              <a:rPr lang="en-US" dirty="0"/>
               <a:t>	update=false</a:t>
             </a:r>
           </a:p>
@@ -51158,51 +51602,75 @@
           <a:lstStyle/>
           <a:p>
             <a:r>
-              <a:rPr lang="en-US"/>
-              <a:t>MongoDB-Hadoop Connector</a:t>
+              <a:rPr lang="en-US" dirty="0" err="1"/>
+              <a:t>MongoDB-Hadoop</a:t>
+            </a:r>
+            <a:r>
+              <a:rPr lang="en-US" dirty="0"/>
+              <a:t> Connector</a:t>
             </a:r>
           </a:p>
           <a:p>
             <a:pPr lvl="1"/>
             <a:r>
-              <a:rPr lang="en-US">
+              <a:rPr lang="en-US" dirty="0">
                 <a:hlinkClick r:id="rId2"/>
               </a:rPr>
               <a:t>https://github.com/mongodb/mongo-hadoop/</a:t>
             </a:r>
-            <a:endParaRPr lang="en-US"/>
-          </a:p>
-          <a:p>
-            <a:r>
-              <a:rPr lang="en-US"/>
-              <a:t>MongoDB-Hadoop Workshop</a:t>
+            <a:endParaRPr lang="en-US" dirty="0"/>
+          </a:p>
+          <a:p>
+            <a:r>
+              <a:rPr lang="en-US" dirty="0" err="1"/>
+              <a:t>MongoDB-Hadoop</a:t>
+            </a:r>
+            <a:r>
+              <a:rPr lang="en-US" dirty="0"/>
+              <a:t> Workshop</a:t>
             </a:r>
           </a:p>
           <a:p>
             <a:pPr lvl="1"/>
             <a:r>
-              <a:rPr lang="en-US">
+              <a:rPr lang="en-US" dirty="0">
                 <a:hlinkClick r:id="rId3"/>
               </a:rPr>
-              <a:t>https://github.com/crcsmnky/mongodb-hadoop-workshop</a:t>
-            </a:r>
-            <a:endParaRPr lang="en-US"/>
-          </a:p>
-          <a:p>
-            <a:r>
-              <a:rPr lang="en-US"/>
-              <a:t>MongoDB-Spark Demo</a:t>
+              <a:t>https://github.com</a:t>
+            </a:r>
+            <a:r>
+              <a:rPr lang="en-US" dirty="0" smtClean="0">
+                <a:hlinkClick r:id="rId3"/>
+              </a:rPr>
+              <a:t>/evanchooly/</a:t>
+            </a:r>
+            <a:r>
+              <a:rPr lang="en-US" dirty="0">
+                <a:hlinkClick r:id="rId3"/>
+              </a:rPr>
+              <a:t>mongodb-hadoop-workshop</a:t>
+            </a:r>
+            <a:endParaRPr lang="en-US" dirty="0"/>
+          </a:p>
+          <a:p>
+            <a:r>
+              <a:rPr lang="en-US" dirty="0" err="1"/>
+              <a:t>MongoDB</a:t>
+            </a:r>
+            <a:r>
+              <a:rPr lang="en-US" dirty="0"/>
+              <a:t>-Spark Demo</a:t>
             </a:r>
           </a:p>
           <a:p>
             <a:pPr lvl="1"/>
             <a:r>
-              <a:rPr lang="en-US">
+              <a:rPr lang="en-US" dirty="0">
                 <a:hlinkClick r:id="rId4"/>
               </a:rPr>
               <a:t>https://github.com/crcsmnky/mongodb-spark-demo</a:t>
             </a:r>
-            <a:endParaRPr lang="en-US"/>
+            <a:endParaRPr lang="en-US" dirty="0"/>
           </a:p>
         </p:txBody>
       </p:sp>

</xml_diff>